<commit_message>
slight adjustment in figure
</commit_message>
<xml_diff>
--- a/module1_data_download/URLs_relation.pptx
+++ b/module1_data_download/URLs_relation.pptx
@@ -104,6 +104,11 @@
       </a:defRPr>
     </a:lvl9pPr>
   </p:defaultTextStyle>
+  <p:extLst>
+    <p:ext uri="{EFAFB233-063F-42B5-8137-9DF3F51BA10A}">
+      <p15:sldGuideLst xmlns:p15="http://schemas.microsoft.com/office/powerpoint/2012/main"/>
+    </p:ext>
+  </p:extLst>
 </p:presentation>
 </file>
 
@@ -256,7 +261,7 @@
           <a:p>
             <a:fld id="{8A348815-830C-BD4C-A425-08310E088E25}" type="datetimeFigureOut">
               <a:rPr lang="hu-HU" smtClean="0"/>
-              <a:t>2020. 02. 12.</a:t>
+              <a:t>2020. 02. 17.</a:t>
             </a:fld>
             <a:endParaRPr lang="hu-HU"/>
           </a:p>
@@ -456,7 +461,7 @@
           <a:p>
             <a:fld id="{8A348815-830C-BD4C-A425-08310E088E25}" type="datetimeFigureOut">
               <a:rPr lang="hu-HU" smtClean="0"/>
-              <a:t>2020. 02. 12.</a:t>
+              <a:t>2020. 02. 17.</a:t>
             </a:fld>
             <a:endParaRPr lang="hu-HU"/>
           </a:p>
@@ -666,7 +671,7 @@
           <a:p>
             <a:fld id="{8A348815-830C-BD4C-A425-08310E088E25}" type="datetimeFigureOut">
               <a:rPr lang="hu-HU" smtClean="0"/>
-              <a:t>2020. 02. 12.</a:t>
+              <a:t>2020. 02. 17.</a:t>
             </a:fld>
             <a:endParaRPr lang="hu-HU"/>
           </a:p>
@@ -866,7 +871,7 @@
           <a:p>
             <a:fld id="{8A348815-830C-BD4C-A425-08310E088E25}" type="datetimeFigureOut">
               <a:rPr lang="hu-HU" smtClean="0"/>
-              <a:t>2020. 02. 12.</a:t>
+              <a:t>2020. 02. 17.</a:t>
             </a:fld>
             <a:endParaRPr lang="hu-HU"/>
           </a:p>
@@ -1142,7 +1147,7 @@
           <a:p>
             <a:fld id="{8A348815-830C-BD4C-A425-08310E088E25}" type="datetimeFigureOut">
               <a:rPr lang="hu-HU" smtClean="0"/>
-              <a:t>2020. 02. 12.</a:t>
+              <a:t>2020. 02. 17.</a:t>
             </a:fld>
             <a:endParaRPr lang="hu-HU"/>
           </a:p>
@@ -1410,7 +1415,7 @@
           <a:p>
             <a:fld id="{8A348815-830C-BD4C-A425-08310E088E25}" type="datetimeFigureOut">
               <a:rPr lang="hu-HU" smtClean="0"/>
-              <a:t>2020. 02. 12.</a:t>
+              <a:t>2020. 02. 17.</a:t>
             </a:fld>
             <a:endParaRPr lang="hu-HU"/>
           </a:p>
@@ -1825,7 +1830,7 @@
           <a:p>
             <a:fld id="{8A348815-830C-BD4C-A425-08310E088E25}" type="datetimeFigureOut">
               <a:rPr lang="hu-HU" smtClean="0"/>
-              <a:t>2020. 02. 12.</a:t>
+              <a:t>2020. 02. 17.</a:t>
             </a:fld>
             <a:endParaRPr lang="hu-HU"/>
           </a:p>
@@ -1967,7 +1972,7 @@
           <a:p>
             <a:fld id="{8A348815-830C-BD4C-A425-08310E088E25}" type="datetimeFigureOut">
               <a:rPr lang="hu-HU" smtClean="0"/>
-              <a:t>2020. 02. 12.</a:t>
+              <a:t>2020. 02. 17.</a:t>
             </a:fld>
             <a:endParaRPr lang="hu-HU"/>
           </a:p>
@@ -2080,7 +2085,7 @@
           <a:p>
             <a:fld id="{8A348815-830C-BD4C-A425-08310E088E25}" type="datetimeFigureOut">
               <a:rPr lang="hu-HU" smtClean="0"/>
-              <a:t>2020. 02. 12.</a:t>
+              <a:t>2020. 02. 17.</a:t>
             </a:fld>
             <a:endParaRPr lang="hu-HU"/>
           </a:p>
@@ -2393,7 +2398,7 @@
           <a:p>
             <a:fld id="{8A348815-830C-BD4C-A425-08310E088E25}" type="datetimeFigureOut">
               <a:rPr lang="hu-HU" smtClean="0"/>
-              <a:t>2020. 02. 12.</a:t>
+              <a:t>2020. 02. 17.</a:t>
             </a:fld>
             <a:endParaRPr lang="hu-HU"/>
           </a:p>
@@ -2682,7 +2687,7 @@
           <a:p>
             <a:fld id="{8A348815-830C-BD4C-A425-08310E088E25}" type="datetimeFigureOut">
               <a:rPr lang="hu-HU" smtClean="0"/>
-              <a:t>2020. 02. 12.</a:t>
+              <a:t>2020. 02. 17.</a:t>
             </a:fld>
             <a:endParaRPr lang="hu-HU"/>
           </a:p>
@@ -2925,7 +2930,7 @@
           <a:p>
             <a:fld id="{8A348815-830C-BD4C-A425-08310E088E25}" type="datetimeFigureOut">
               <a:rPr lang="hu-HU" smtClean="0"/>
-              <a:t>2020. 02. 12.</a:t>
+              <a:t>2020. 02. 17.</a:t>
             </a:fld>
             <a:endParaRPr lang="hu-HU"/>
           </a:p>
@@ -4617,6 +4622,54 @@
           <a:ln w="19050">
             <a:solidFill>
               <a:schemeClr val="accent2"/>
+            </a:solidFill>
+            <a:tailEnd type="triangle"/>
+          </a:ln>
+        </p:spPr>
+        <p:style>
+          <a:lnRef idx="1">
+            <a:schemeClr val="accent1"/>
+          </a:lnRef>
+          <a:fillRef idx="0">
+            <a:schemeClr val="accent1"/>
+          </a:fillRef>
+          <a:effectRef idx="0">
+            <a:schemeClr val="accent1"/>
+          </a:effectRef>
+          <a:fontRef idx="minor">
+            <a:schemeClr val="tx1"/>
+          </a:fontRef>
+        </p:style>
+      </p:cxnSp>
+      <p:cxnSp>
+        <p:nvCxnSpPr>
+          <p:cNvPr id="30" name="Straight Arrow Connector 29">
+            <a:extLst>
+              <a:ext uri="{FF2B5EF4-FFF2-40B4-BE49-F238E27FC236}">
+                <a16:creationId xmlns:a16="http://schemas.microsoft.com/office/drawing/2014/main" id="{E6DB14FA-E316-0B44-908D-2DAB6170B297}"/>
+              </a:ext>
+            </a:extLst>
+          </p:cNvPr>
+          <p:cNvCxnSpPr>
+            <a:cxnSpLocks/>
+            <a:stCxn id="7" idx="3"/>
+            <a:endCxn id="50" idx="1"/>
+          </p:cNvCxnSpPr>
+          <p:nvPr/>
+        </p:nvCxnSpPr>
+        <p:spPr>
+          <a:xfrm>
+            <a:off x="2165164" y="3613666"/>
+            <a:ext cx="2022865" cy="635214"/>
+          </a:xfrm>
+          <a:prstGeom prst="straightConnector1">
+            <a:avLst/>
+          </a:prstGeom>
+          <a:ln w="19050">
+            <a:solidFill>
+              <a:schemeClr val="accent6">
+                <a:lumMod val="75000"/>
+              </a:schemeClr>
             </a:solidFill>
             <a:tailEnd type="triangle"/>
           </a:ln>

</xml_diff>